<commit_message>
adding more build documentation
</commit_message>
<xml_diff>
--- a/builds/build-3dprinted-parts.pptx
+++ b/builds/build-3dprinted-parts.pptx
@@ -107,6 +107,11 @@
       </a:defRPr>
     </a:lvl9pPr>
   </p:defaultTextStyle>
+  <p:extLst>
+    <p:ext uri="{EFAFB233-063F-42B5-8137-9DF3F51BA10A}">
+      <p15:sldGuideLst xmlns:p15="http://schemas.microsoft.com/office/powerpoint/2012/main"/>
+    </p:ext>
+  </p:extLst>
 </p:presentation>
 </file>
 
@@ -257,7 +262,7 @@
           <a:p>
             <a:fld id="{C54288AB-9523-4894-857C-3B5F08FFDB3C}" type="datetimeFigureOut">
               <a:rPr lang="en-US" smtClean="0"/>
-              <a:t>8/8/2024</a:t>
+              <a:t>8/10/2024</a:t>
             </a:fld>
             <a:endParaRPr lang="en-US"/>
           </a:p>
@@ -455,7 +460,7 @@
           <a:p>
             <a:fld id="{C54288AB-9523-4894-857C-3B5F08FFDB3C}" type="datetimeFigureOut">
               <a:rPr lang="en-US" smtClean="0"/>
-              <a:t>8/8/2024</a:t>
+              <a:t>8/10/2024</a:t>
             </a:fld>
             <a:endParaRPr lang="en-US"/>
           </a:p>
@@ -663,7 +668,7 @@
           <a:p>
             <a:fld id="{C54288AB-9523-4894-857C-3B5F08FFDB3C}" type="datetimeFigureOut">
               <a:rPr lang="en-US" smtClean="0"/>
-              <a:t>8/8/2024</a:t>
+              <a:t>8/10/2024</a:t>
             </a:fld>
             <a:endParaRPr lang="en-US"/>
           </a:p>
@@ -861,7 +866,7 @@
           <a:p>
             <a:fld id="{C54288AB-9523-4894-857C-3B5F08FFDB3C}" type="datetimeFigureOut">
               <a:rPr lang="en-US" smtClean="0"/>
-              <a:t>8/8/2024</a:t>
+              <a:t>8/10/2024</a:t>
             </a:fld>
             <a:endParaRPr lang="en-US"/>
           </a:p>
@@ -1136,7 +1141,7 @@
           <a:p>
             <a:fld id="{C54288AB-9523-4894-857C-3B5F08FFDB3C}" type="datetimeFigureOut">
               <a:rPr lang="en-US" smtClean="0"/>
-              <a:t>8/8/2024</a:t>
+              <a:t>8/10/2024</a:t>
             </a:fld>
             <a:endParaRPr lang="en-US"/>
           </a:p>
@@ -1401,7 +1406,7 @@
           <a:p>
             <a:fld id="{C54288AB-9523-4894-857C-3B5F08FFDB3C}" type="datetimeFigureOut">
               <a:rPr lang="en-US" smtClean="0"/>
-              <a:t>8/8/2024</a:t>
+              <a:t>8/10/2024</a:t>
             </a:fld>
             <a:endParaRPr lang="en-US"/>
           </a:p>
@@ -1813,7 +1818,7 @@
           <a:p>
             <a:fld id="{C54288AB-9523-4894-857C-3B5F08FFDB3C}" type="datetimeFigureOut">
               <a:rPr lang="en-US" smtClean="0"/>
-              <a:t>8/8/2024</a:t>
+              <a:t>8/10/2024</a:t>
             </a:fld>
             <a:endParaRPr lang="en-US"/>
           </a:p>
@@ -1954,7 +1959,7 @@
           <a:p>
             <a:fld id="{C54288AB-9523-4894-857C-3B5F08FFDB3C}" type="datetimeFigureOut">
               <a:rPr lang="en-US" smtClean="0"/>
-              <a:t>8/8/2024</a:t>
+              <a:t>8/10/2024</a:t>
             </a:fld>
             <a:endParaRPr lang="en-US"/>
           </a:p>
@@ -2067,7 +2072,7 @@
           <a:p>
             <a:fld id="{C54288AB-9523-4894-857C-3B5F08FFDB3C}" type="datetimeFigureOut">
               <a:rPr lang="en-US" smtClean="0"/>
-              <a:t>8/8/2024</a:t>
+              <a:t>8/10/2024</a:t>
             </a:fld>
             <a:endParaRPr lang="en-US"/>
           </a:p>
@@ -2378,7 +2383,7 @@
           <a:p>
             <a:fld id="{C54288AB-9523-4894-857C-3B5F08FFDB3C}" type="datetimeFigureOut">
               <a:rPr lang="en-US" smtClean="0"/>
-              <a:t>8/8/2024</a:t>
+              <a:t>8/10/2024</a:t>
             </a:fld>
             <a:endParaRPr lang="en-US"/>
           </a:p>
@@ -2666,7 +2671,7 @@
           <a:p>
             <a:fld id="{C54288AB-9523-4894-857C-3B5F08FFDB3C}" type="datetimeFigureOut">
               <a:rPr lang="en-US" smtClean="0"/>
-              <a:t>8/8/2024</a:t>
+              <a:t>8/10/2024</a:t>
             </a:fld>
             <a:endParaRPr lang="en-US"/>
           </a:p>
@@ -2907,7 +2912,7 @@
           <a:p>
             <a:fld id="{C54288AB-9523-4894-857C-3B5F08FFDB3C}" type="datetimeFigureOut">
               <a:rPr lang="en-US" smtClean="0"/>
-              <a:t>8/8/2024</a:t>
+              <a:t>8/10/2024</a:t>
             </a:fld>
             <a:endParaRPr lang="en-US"/>
           </a:p>
@@ -3373,7 +3378,22 @@
           <a:bodyPr/>
           <a:lstStyle/>
           <a:p>
-            <a:endParaRPr lang="en-US" dirty="0"/>
+            <a:r>
+              <a:rPr lang="en-US" dirty="0"/>
+              <a:t>Lafe Spietz</a:t>
+            </a:r>
+          </a:p>
+          <a:p>
+            <a:r>
+              <a:rPr lang="en-US" dirty="0"/>
+              <a:t>NIST</a:t>
+            </a:r>
+          </a:p>
+          <a:p>
+            <a:r>
+              <a:rPr lang="en-US" dirty="0"/>
+              <a:t>Summer 2024</a:t>
+            </a:r>
           </a:p>
         </p:txBody>
       </p:sp>
@@ -3891,6 +3911,46 @@
           </a:prstGeom>
         </p:spPr>
       </p:pic>
+      <p:sp>
+        <p:nvSpPr>
+          <p:cNvPr id="3" name="TextBox 2">
+            <a:extLst>
+              <a:ext uri="{FF2B5EF4-FFF2-40B4-BE49-F238E27FC236}">
+                <a16:creationId xmlns:a16="http://schemas.microsoft.com/office/drawing/2014/main" id="{51C34F39-EE03-F964-FA96-F05D1DB72B13}"/>
+              </a:ext>
+            </a:extLst>
+          </p:cNvPr>
+          <p:cNvSpPr txBox="1"/>
+          <p:nvPr/>
+        </p:nvSpPr>
+        <p:spPr>
+          <a:xfrm>
+            <a:off x="3450210" y="6334812"/>
+            <a:ext cx="4590167" cy="369332"/>
+          </a:xfrm>
+          <a:prstGeom prst="rect">
+            <a:avLst/>
+          </a:prstGeom>
+          <a:noFill/>
+        </p:spPr>
+        <p:txBody>
+          <a:bodyPr wrap="none" rtlCol="0">
+            <a:spAutoFit/>
+          </a:bodyPr>
+          <a:lstStyle/>
+          <a:p>
+            <a:r>
+              <a:rPr lang="en-US" dirty="0"/>
+              <a:t>Insert with soldering iron, in a press </a:t>
+            </a:r>
+            <a:r>
+              <a:rPr lang="en-US"/>
+              <a:t>if available</a:t>
+            </a:r>
+            <a:endParaRPr lang="en-US" dirty="0"/>
+          </a:p>
+        </p:txBody>
+      </p:sp>
     </p:spTree>
     <p:extLst>
       <p:ext uri="{BB962C8B-B14F-4D97-AF65-F5344CB8AC3E}">

</xml_diff>